<commit_message>
update website to allow "Other" category
</commit_message>
<xml_diff>
--- a/DanyloThoughts.pptx
+++ b/DanyloThoughts.pptx
@@ -21,6 +21,7 @@
     <p:sldId id="271" r:id="rId15"/>
     <p:sldId id="258" r:id="rId16"/>
     <p:sldId id="259" r:id="rId17"/>
+    <p:sldId id="272" r:id="rId18"/>
   </p:sldIdLst>
   <p:sldSz cx="12192000" cy="6858000"/>
   <p:notesSz cx="6858000" cy="9144000"/>
@@ -143,6 +144,11 @@
             <p14:sldId id="271"/>
             <p14:sldId id="258"/>
             <p14:sldId id="259"/>
+          </p14:sldIdLst>
+        </p14:section>
+        <p14:section name="Demo" id="{A482E7EB-C853-4954-9AF3-E38488412085}">
+          <p14:sldIdLst>
+            <p14:sldId id="272"/>
           </p14:sldIdLst>
         </p14:section>
       </p14:sectionLst>
@@ -5850,7 +5856,7 @@
           <a:p>
             <a:fld id="{990D8905-EC0B-41E3-AC8C-C6823787CC1C}" type="datetimeFigureOut">
               <a:rPr lang="en-CA" smtClean="0"/>
-              <a:t>2021-12-01</a:t>
+              <a:t>2021-12-08</a:t>
             </a:fld>
             <a:endParaRPr lang="en-CA"/>
           </a:p>
@@ -6148,7 +6154,7 @@
           <a:p>
             <a:fld id="{990D8905-EC0B-41E3-AC8C-C6823787CC1C}" type="datetimeFigureOut">
               <a:rPr lang="en-CA" smtClean="0"/>
-              <a:t>2021-12-01</a:t>
+              <a:t>2021-12-08</a:t>
             </a:fld>
             <a:endParaRPr lang="en-CA"/>
           </a:p>
@@ -6340,7 +6346,7 @@
           <a:p>
             <a:fld id="{990D8905-EC0B-41E3-AC8C-C6823787CC1C}" type="datetimeFigureOut">
               <a:rPr lang="en-CA" smtClean="0"/>
-              <a:t>2021-12-01</a:t>
+              <a:t>2021-12-08</a:t>
             </a:fld>
             <a:endParaRPr lang="en-CA"/>
           </a:p>
@@ -6601,7 +6607,7 @@
           <a:p>
             <a:fld id="{990D8905-EC0B-41E3-AC8C-C6823787CC1C}" type="datetimeFigureOut">
               <a:rPr lang="en-CA" smtClean="0"/>
-              <a:t>2021-12-01</a:t>
+              <a:t>2021-12-08</a:t>
             </a:fld>
             <a:endParaRPr lang="en-CA"/>
           </a:p>
@@ -7025,7 +7031,7 @@
           <a:p>
             <a:fld id="{990D8905-EC0B-41E3-AC8C-C6823787CC1C}" type="datetimeFigureOut">
               <a:rPr lang="en-CA" smtClean="0"/>
-              <a:t>2021-12-01</a:t>
+              <a:t>2021-12-08</a:t>
             </a:fld>
             <a:endParaRPr lang="en-CA"/>
           </a:p>
@@ -7562,7 +7568,7 @@
           <a:p>
             <a:fld id="{990D8905-EC0B-41E3-AC8C-C6823787CC1C}" type="datetimeFigureOut">
               <a:rPr lang="en-CA" smtClean="0"/>
-              <a:t>2021-12-01</a:t>
+              <a:t>2021-12-08</a:t>
             </a:fld>
             <a:endParaRPr lang="en-CA"/>
           </a:p>
@@ -8426,7 +8432,7 @@
           <a:p>
             <a:fld id="{990D8905-EC0B-41E3-AC8C-C6823787CC1C}" type="datetimeFigureOut">
               <a:rPr lang="en-CA" smtClean="0"/>
-              <a:t>2021-12-01</a:t>
+              <a:t>2021-12-08</a:t>
             </a:fld>
             <a:endParaRPr lang="en-CA"/>
           </a:p>
@@ -8596,7 +8602,7 @@
           <a:p>
             <a:fld id="{990D8905-EC0B-41E3-AC8C-C6823787CC1C}" type="datetimeFigureOut">
               <a:rPr lang="en-CA" smtClean="0"/>
-              <a:t>2021-12-01</a:t>
+              <a:t>2021-12-08</a:t>
             </a:fld>
             <a:endParaRPr lang="en-CA"/>
           </a:p>
@@ -8780,7 +8786,7 @@
           <a:p>
             <a:fld id="{990D8905-EC0B-41E3-AC8C-C6823787CC1C}" type="datetimeFigureOut">
               <a:rPr lang="en-CA" smtClean="0"/>
-              <a:t>2021-12-01</a:t>
+              <a:t>2021-12-08</a:t>
             </a:fld>
             <a:endParaRPr lang="en-CA"/>
           </a:p>
@@ -8990,7 +8996,7 @@
           <a:p>
             <a:fld id="{23ECED23-8745-4DCB-895C-E52D60B1B0C5}" type="datetimeFigureOut">
               <a:rPr lang="en-CA" smtClean="0"/>
-              <a:t>2021-11-30</a:t>
+              <a:t>2021-12-08</a:t>
             </a:fld>
             <a:endParaRPr lang="en-CA"/>
           </a:p>
@@ -9190,7 +9196,7 @@
           <a:p>
             <a:fld id="{23ECED23-8745-4DCB-895C-E52D60B1B0C5}" type="datetimeFigureOut">
               <a:rPr lang="en-CA" smtClean="0"/>
-              <a:t>2021-11-30</a:t>
+              <a:t>2021-12-08</a:t>
             </a:fld>
             <a:endParaRPr lang="en-CA"/>
           </a:p>
@@ -9372,7 +9378,7 @@
           <a:p>
             <a:fld id="{990D8905-EC0B-41E3-AC8C-C6823787CC1C}" type="datetimeFigureOut">
               <a:rPr lang="en-CA" smtClean="0"/>
-              <a:t>2021-12-01</a:t>
+              <a:t>2021-12-08</a:t>
             </a:fld>
             <a:endParaRPr lang="en-CA"/>
           </a:p>
@@ -9636,7 +9642,7 @@
           <a:p>
             <a:fld id="{23ECED23-8745-4DCB-895C-E52D60B1B0C5}" type="datetimeFigureOut">
               <a:rPr lang="en-CA" smtClean="0"/>
-              <a:t>2021-11-30</a:t>
+              <a:t>2021-12-08</a:t>
             </a:fld>
             <a:endParaRPr lang="en-CA"/>
           </a:p>
@@ -9904,7 +9910,7 @@
           <a:p>
             <a:fld id="{23ECED23-8745-4DCB-895C-E52D60B1B0C5}" type="datetimeFigureOut">
               <a:rPr lang="en-CA" smtClean="0"/>
-              <a:t>2021-11-30</a:t>
+              <a:t>2021-12-08</a:t>
             </a:fld>
             <a:endParaRPr lang="en-CA"/>
           </a:p>
@@ -10319,7 +10325,7 @@
           <a:p>
             <a:fld id="{23ECED23-8745-4DCB-895C-E52D60B1B0C5}" type="datetimeFigureOut">
               <a:rPr lang="en-CA" smtClean="0"/>
-              <a:t>2021-11-30</a:t>
+              <a:t>2021-12-08</a:t>
             </a:fld>
             <a:endParaRPr lang="en-CA"/>
           </a:p>
@@ -10461,7 +10467,7 @@
           <a:p>
             <a:fld id="{23ECED23-8745-4DCB-895C-E52D60B1B0C5}" type="datetimeFigureOut">
               <a:rPr lang="en-CA" smtClean="0"/>
-              <a:t>2021-11-30</a:t>
+              <a:t>2021-12-08</a:t>
             </a:fld>
             <a:endParaRPr lang="en-CA"/>
           </a:p>
@@ -10574,7 +10580,7 @@
           <a:p>
             <a:fld id="{23ECED23-8745-4DCB-895C-E52D60B1B0C5}" type="datetimeFigureOut">
               <a:rPr lang="en-CA" smtClean="0"/>
-              <a:t>2021-11-30</a:t>
+              <a:t>2021-12-08</a:t>
             </a:fld>
             <a:endParaRPr lang="en-CA"/>
           </a:p>
@@ -10887,7 +10893,7 @@
           <a:p>
             <a:fld id="{23ECED23-8745-4DCB-895C-E52D60B1B0C5}" type="datetimeFigureOut">
               <a:rPr lang="en-CA" smtClean="0"/>
-              <a:t>2021-11-30</a:t>
+              <a:t>2021-12-08</a:t>
             </a:fld>
             <a:endParaRPr lang="en-CA"/>
           </a:p>
@@ -11176,7 +11182,7 @@
           <a:p>
             <a:fld id="{23ECED23-8745-4DCB-895C-E52D60B1B0C5}" type="datetimeFigureOut">
               <a:rPr lang="en-CA" smtClean="0"/>
-              <a:t>2021-11-30</a:t>
+              <a:t>2021-12-08</a:t>
             </a:fld>
             <a:endParaRPr lang="en-CA"/>
           </a:p>
@@ -11376,7 +11382,7 @@
           <a:p>
             <a:fld id="{23ECED23-8745-4DCB-895C-E52D60B1B0C5}" type="datetimeFigureOut">
               <a:rPr lang="en-CA" smtClean="0"/>
-              <a:t>2021-11-30</a:t>
+              <a:t>2021-12-08</a:t>
             </a:fld>
             <a:endParaRPr lang="en-CA"/>
           </a:p>
@@ -11586,7 +11592,7 @@
           <a:p>
             <a:fld id="{23ECED23-8745-4DCB-895C-E52D60B1B0C5}" type="datetimeFigureOut">
               <a:rPr lang="en-CA" smtClean="0"/>
-              <a:t>2021-11-30</a:t>
+              <a:t>2021-12-08</a:t>
             </a:fld>
             <a:endParaRPr lang="en-CA"/>
           </a:p>
@@ -11842,7 +11848,7 @@
           <a:p>
             <a:fld id="{990D8905-EC0B-41E3-AC8C-C6823787CC1C}" type="datetimeFigureOut">
               <a:rPr lang="en-CA" smtClean="0"/>
-              <a:t>2021-12-01</a:t>
+              <a:t>2021-12-08</a:t>
             </a:fld>
             <a:endParaRPr lang="en-CA"/>
           </a:p>
@@ -12078,7 +12084,7 @@
           <a:p>
             <a:fld id="{990D8905-EC0B-41E3-AC8C-C6823787CC1C}" type="datetimeFigureOut">
               <a:rPr lang="en-CA" smtClean="0"/>
-              <a:t>2021-12-01</a:t>
+              <a:t>2021-12-08</a:t>
             </a:fld>
             <a:endParaRPr lang="en-CA"/>
           </a:p>
@@ -12544,7 +12550,7 @@
           <a:p>
             <a:fld id="{990D8905-EC0B-41E3-AC8C-C6823787CC1C}" type="datetimeFigureOut">
               <a:rPr lang="en-CA" smtClean="0"/>
-              <a:t>2021-12-01</a:t>
+              <a:t>2021-12-08</a:t>
             </a:fld>
             <a:endParaRPr lang="en-CA"/>
           </a:p>
@@ -12662,7 +12668,7 @@
           <a:p>
             <a:fld id="{990D8905-EC0B-41E3-AC8C-C6823787CC1C}" type="datetimeFigureOut">
               <a:rPr lang="en-CA" smtClean="0"/>
-              <a:t>2021-12-01</a:t>
+              <a:t>2021-12-08</a:t>
             </a:fld>
             <a:endParaRPr lang="en-CA"/>
           </a:p>
@@ -12757,7 +12763,7 @@
           <a:p>
             <a:fld id="{990D8905-EC0B-41E3-AC8C-C6823787CC1C}" type="datetimeFigureOut">
               <a:rPr lang="en-CA" smtClean="0"/>
-              <a:t>2021-12-01</a:t>
+              <a:t>2021-12-08</a:t>
             </a:fld>
             <a:endParaRPr lang="en-CA"/>
           </a:p>
@@ -13012,7 +13018,7 @@
           <a:p>
             <a:fld id="{990D8905-EC0B-41E3-AC8C-C6823787CC1C}" type="datetimeFigureOut">
               <a:rPr lang="en-CA" smtClean="0"/>
-              <a:t>2021-12-01</a:t>
+              <a:t>2021-12-08</a:t>
             </a:fld>
             <a:endParaRPr lang="en-CA"/>
           </a:p>
@@ -13312,7 +13318,7 @@
           <a:p>
             <a:fld id="{990D8905-EC0B-41E3-AC8C-C6823787CC1C}" type="datetimeFigureOut">
               <a:rPr lang="en-CA" smtClean="0"/>
-              <a:t>2021-12-01</a:t>
+              <a:t>2021-12-08</a:t>
             </a:fld>
             <a:endParaRPr lang="en-CA"/>
           </a:p>
@@ -13546,7 +13552,7 @@
           <a:p>
             <a:fld id="{990D8905-EC0B-41E3-AC8C-C6823787CC1C}" type="datetimeFigureOut">
               <a:rPr lang="en-CA" smtClean="0"/>
-              <a:t>2021-12-01</a:t>
+              <a:t>2021-12-08</a:t>
             </a:fld>
             <a:endParaRPr lang="en-CA"/>
           </a:p>
@@ -14373,7 +14379,7 @@
           <a:p>
             <a:fld id="{23ECED23-8745-4DCB-895C-E52D60B1B0C5}" type="datetimeFigureOut">
               <a:rPr lang="en-CA" smtClean="0"/>
-              <a:t>2021-11-30</a:t>
+              <a:t>2021-12-08</a:t>
             </a:fld>
             <a:endParaRPr lang="en-CA"/>
           </a:p>
@@ -18096,6 +18102,197 @@
     <p:extLst>
       <p:ext uri="{BB962C8B-B14F-4D97-AF65-F5344CB8AC3E}">
         <p14:creationId xmlns:p14="http://schemas.microsoft.com/office/powerpoint/2010/main" val="847662075"/>
+      </p:ext>
+    </p:extLst>
+  </p:cSld>
+  <p:clrMapOvr>
+    <a:masterClrMapping/>
+  </p:clrMapOvr>
+</p:sld>
+</file>
+
+<file path=ppt/slides/slide16.xml><?xml version="1.0" encoding="utf-8"?>
+<p:sld xmlns:a="http://schemas.openxmlformats.org/drawingml/2006/main" xmlns:r="http://schemas.openxmlformats.org/officeDocument/2006/relationships" xmlns:p="http://schemas.openxmlformats.org/presentationml/2006/main">
+  <p:cSld>
+    <p:spTree>
+      <p:nvGrpSpPr>
+        <p:cNvPr id="1" name=""/>
+        <p:cNvGrpSpPr/>
+        <p:nvPr/>
+      </p:nvGrpSpPr>
+      <p:grpSpPr>
+        <a:xfrm>
+          <a:off x="0" y="0"/>
+          <a:ext cx="0" cy="0"/>
+          <a:chOff x="0" y="0"/>
+          <a:chExt cx="0" cy="0"/>
+        </a:xfrm>
+      </p:grpSpPr>
+      <p:sp>
+        <p:nvSpPr>
+          <p:cNvPr id="2" name="Title 1">
+            <a:extLst>
+              <a:ext uri="{FF2B5EF4-FFF2-40B4-BE49-F238E27FC236}">
+                <a16:creationId xmlns:a16="http://schemas.microsoft.com/office/drawing/2014/main" id="{393D1089-8912-4124-8A26-8211D21C725D}"/>
+              </a:ext>
+            </a:extLst>
+          </p:cNvPr>
+          <p:cNvSpPr>
+            <a:spLocks noGrp="1"/>
+          </p:cNvSpPr>
+          <p:nvPr>
+            <p:ph type="title"/>
+          </p:nvPr>
+        </p:nvSpPr>
+        <p:spPr/>
+        <p:txBody>
+          <a:bodyPr/>
+          <a:lstStyle/>
+          <a:p>
+            <a:r>
+              <a:rPr lang="en-US" dirty="0"/>
+              <a:t>Construction Management – Back-End Code</a:t>
+            </a:r>
+            <a:endParaRPr lang="en-CA" dirty="0"/>
+          </a:p>
+        </p:txBody>
+      </p:sp>
+      <p:sp>
+        <p:nvSpPr>
+          <p:cNvPr id="6" name="Text Placeholder 5">
+            <a:extLst>
+              <a:ext uri="{FF2B5EF4-FFF2-40B4-BE49-F238E27FC236}">
+                <a16:creationId xmlns:a16="http://schemas.microsoft.com/office/drawing/2014/main" id="{F0CBAEEE-5D1D-4920-B8B0-2FF33CC5C23A}"/>
+              </a:ext>
+            </a:extLst>
+          </p:cNvPr>
+          <p:cNvSpPr>
+            <a:spLocks noGrp="1"/>
+          </p:cNvSpPr>
+          <p:nvPr>
+            <p:ph type="body" idx="1"/>
+          </p:nvPr>
+        </p:nvSpPr>
+        <p:spPr/>
+        <p:txBody>
+          <a:bodyPr/>
+          <a:lstStyle/>
+          <a:p>
+            <a:r>
+              <a:rPr lang="en-US" dirty="0"/>
+              <a:t>Data after Feature Engineering</a:t>
+            </a:r>
+            <a:endParaRPr lang="en-CA" dirty="0"/>
+          </a:p>
+        </p:txBody>
+      </p:sp>
+      <p:pic>
+        <p:nvPicPr>
+          <p:cNvPr id="12" name="Content Placeholder 11">
+            <a:extLst>
+              <a:ext uri="{FF2B5EF4-FFF2-40B4-BE49-F238E27FC236}">
+                <a16:creationId xmlns:a16="http://schemas.microsoft.com/office/drawing/2014/main" id="{441F4013-B897-4203-9979-6E17E48FF1E0}"/>
+              </a:ext>
+            </a:extLst>
+          </p:cNvPr>
+          <p:cNvPicPr>
+            <a:picLocks noGrp="1" noChangeAspect="1"/>
+          </p:cNvPicPr>
+          <p:nvPr>
+            <p:ph sz="half" idx="2"/>
+          </p:nvPr>
+        </p:nvPicPr>
+        <p:blipFill>
+          <a:blip r:embed="rId2"/>
+          <a:stretch>
+            <a:fillRect/>
+          </a:stretch>
+        </p:blipFill>
+        <p:spPr>
+          <a:xfrm>
+            <a:off x="1006475" y="2712885"/>
+            <a:ext cx="4875213" cy="2745092"/>
+          </a:xfrm>
+          <a:prstGeom prst="rect">
+            <a:avLst/>
+          </a:prstGeom>
+        </p:spPr>
+      </p:pic>
+      <p:sp>
+        <p:nvSpPr>
+          <p:cNvPr id="8" name="Text Placeholder 7">
+            <a:extLst>
+              <a:ext uri="{FF2B5EF4-FFF2-40B4-BE49-F238E27FC236}">
+                <a16:creationId xmlns:a16="http://schemas.microsoft.com/office/drawing/2014/main" id="{F17D915B-2981-4D17-B859-A4178B076AF9}"/>
+              </a:ext>
+            </a:extLst>
+          </p:cNvPr>
+          <p:cNvSpPr>
+            <a:spLocks noGrp="1"/>
+          </p:cNvSpPr>
+          <p:nvPr>
+            <p:ph type="body" sz="quarter" idx="3"/>
+          </p:nvPr>
+        </p:nvSpPr>
+        <p:spPr/>
+        <p:txBody>
+          <a:bodyPr/>
+          <a:lstStyle/>
+          <a:p>
+            <a:r>
+              <a:rPr lang="en-US" dirty="0"/>
+              <a:t>Tasks</a:t>
+            </a:r>
+          </a:p>
+        </p:txBody>
+      </p:sp>
+      <p:sp>
+        <p:nvSpPr>
+          <p:cNvPr id="9" name="Content Placeholder 8">
+            <a:extLst>
+              <a:ext uri="{FF2B5EF4-FFF2-40B4-BE49-F238E27FC236}">
+                <a16:creationId xmlns:a16="http://schemas.microsoft.com/office/drawing/2014/main" id="{3F734B33-8087-42A0-A446-39496FB429AC}"/>
+              </a:ext>
+            </a:extLst>
+          </p:cNvPr>
+          <p:cNvSpPr>
+            <a:spLocks noGrp="1"/>
+          </p:cNvSpPr>
+          <p:nvPr>
+            <p:ph sz="quarter" idx="4"/>
+          </p:nvPr>
+        </p:nvSpPr>
+        <p:spPr/>
+        <p:txBody>
+          <a:bodyPr/>
+          <a:lstStyle/>
+          <a:p>
+            <a:r>
+              <a:rPr lang="en-US" dirty="0"/>
+              <a:t>With a user input of a transformation type and a description:</a:t>
+            </a:r>
+          </a:p>
+          <a:p>
+            <a:pPr lvl="1"/>
+            <a:r>
+              <a:rPr lang="en-US" sz="1800" dirty="0"/>
+              <a:t>Predict rate at which tasks can be completed.</a:t>
+            </a:r>
+          </a:p>
+          <a:p>
+            <a:pPr lvl="1"/>
+            <a:r>
+              <a:rPr lang="en-US" sz="1800" dirty="0"/>
+              <a:t>Predict type of units </a:t>
+            </a:r>
+            <a:endParaRPr lang="en-CA" sz="1800" dirty="0"/>
+          </a:p>
+        </p:txBody>
+      </p:sp>
+    </p:spTree>
+    <p:extLst>
+      <p:ext uri="{BB962C8B-B14F-4D97-AF65-F5344CB8AC3E}">
+        <p14:creationId xmlns:p14="http://schemas.microsoft.com/office/powerpoint/2010/main" val="3746747555"/>
       </p:ext>
     </p:extLst>
   </p:cSld>

</xml_diff>